<commit_message>
rectified ERD, updated ppt
</commit_message>
<xml_diff>
--- a/PPT/DBMS project ppt.pptx
+++ b/PPT/DBMS project ppt.pptx
@@ -817,7 +817,7 @@
   <p:cSld>
     <p:spTree>
       <p:nvGrpSpPr>
-        <p:cNvPr id="129" name="Shape 129"/>
+        <p:cNvPr id="133" name="Shape 133"/>
         <p:cNvGrpSpPr/>
         <p:nvPr/>
       </p:nvGrpSpPr>
@@ -831,7 +831,7 @@
       </p:grpSpPr>
       <p:sp>
         <p:nvSpPr>
-          <p:cNvPr id="130" name="Google Shape;130;gb2dc987236_0_328:notes"/>
+          <p:cNvPr id="134" name="Google Shape;134;gb2dc987236_0_328:notes"/>
           <p:cNvSpPr/>
           <p:nvPr>
             <p:ph idx="2" type="sldImg"/>
@@ -866,7 +866,7 @@
       </p:sp>
       <p:sp>
         <p:nvSpPr>
-          <p:cNvPr id="131" name="Google Shape;131;gb2dc987236_0_328:notes"/>
+          <p:cNvPr id="135" name="Google Shape;135;gb2dc987236_0_328:notes"/>
           <p:cNvSpPr txBox="1"/>
           <p:nvPr>
             <p:ph idx="1" type="body"/>
@@ -916,7 +916,7 @@
   <p:cSld>
     <p:spTree>
       <p:nvGrpSpPr>
-        <p:cNvPr id="137" name="Shape 137"/>
+        <p:cNvPr id="141" name="Shape 141"/>
         <p:cNvGrpSpPr/>
         <p:nvPr/>
       </p:nvGrpSpPr>
@@ -930,7 +930,7 @@
       </p:grpSpPr>
       <p:sp>
         <p:nvSpPr>
-          <p:cNvPr id="138" name="Google Shape;138;gaa1ae0a015_0_0:notes"/>
+          <p:cNvPr id="142" name="Google Shape;142;gaa1ae0a015_0_0:notes"/>
           <p:cNvSpPr/>
           <p:nvPr>
             <p:ph idx="2" type="sldImg"/>
@@ -965,7 +965,7 @@
       </p:sp>
       <p:sp>
         <p:nvSpPr>
-          <p:cNvPr id="139" name="Google Shape;139;gaa1ae0a015_0_0:notes"/>
+          <p:cNvPr id="143" name="Google Shape;143;gaa1ae0a015_0_0:notes"/>
           <p:cNvSpPr txBox="1"/>
           <p:nvPr>
             <p:ph idx="1" type="body"/>
@@ -1015,7 +1015,7 @@
   <p:cSld>
     <p:spTree>
       <p:nvGrpSpPr>
-        <p:cNvPr id="143" name="Shape 143"/>
+        <p:cNvPr id="147" name="Shape 147"/>
         <p:cNvGrpSpPr/>
         <p:nvPr/>
       </p:nvGrpSpPr>
@@ -1029,7 +1029,7 @@
       </p:grpSpPr>
       <p:sp>
         <p:nvSpPr>
-          <p:cNvPr id="144" name="Google Shape;144;gb2dc987236_5_0:notes"/>
+          <p:cNvPr id="148" name="Google Shape;148;gb2dc987236_5_0:notes"/>
           <p:cNvSpPr/>
           <p:nvPr>
             <p:ph idx="2" type="sldImg"/>
@@ -1064,7 +1064,7 @@
       </p:sp>
       <p:sp>
         <p:nvSpPr>
-          <p:cNvPr id="145" name="Google Shape;145;gb2dc987236_5_0:notes"/>
+          <p:cNvPr id="149" name="Google Shape;149;gb2dc987236_5_0:notes"/>
           <p:cNvSpPr txBox="1"/>
           <p:nvPr>
             <p:ph idx="1" type="body"/>
@@ -1114,7 +1114,7 @@
   <p:cSld>
     <p:spTree>
       <p:nvGrpSpPr>
-        <p:cNvPr id="149" name="Shape 149"/>
+        <p:cNvPr id="153" name="Shape 153"/>
         <p:cNvGrpSpPr/>
         <p:nvPr/>
       </p:nvGrpSpPr>
@@ -1128,7 +1128,7 @@
       </p:grpSpPr>
       <p:sp>
         <p:nvSpPr>
-          <p:cNvPr id="150" name="Google Shape;150;gc6f75fceb_0_65:notes"/>
+          <p:cNvPr id="154" name="Google Shape;154;gc6f75fceb_0_65:notes"/>
           <p:cNvSpPr/>
           <p:nvPr>
             <p:ph idx="2" type="sldImg"/>
@@ -1163,7 +1163,7 @@
       </p:sp>
       <p:sp>
         <p:nvSpPr>
-          <p:cNvPr id="151" name="Google Shape;151;gc6f75fceb_0_65:notes"/>
+          <p:cNvPr id="155" name="Google Shape;155;gc6f75fceb_0_65:notes"/>
           <p:cNvSpPr txBox="1"/>
           <p:nvPr>
             <p:ph idx="1" type="body"/>
@@ -1708,7 +1708,7 @@
   <p:cSld>
     <p:spTree>
       <p:nvGrpSpPr>
-        <p:cNvPr id="93" name="Shape 93"/>
+        <p:cNvPr id="97" name="Shape 97"/>
         <p:cNvGrpSpPr/>
         <p:nvPr/>
       </p:nvGrpSpPr>
@@ -1722,7 +1722,7 @@
       </p:grpSpPr>
       <p:sp>
         <p:nvSpPr>
-          <p:cNvPr id="94" name="Google Shape;94;gc6f75fceb_0_26:notes"/>
+          <p:cNvPr id="98" name="Google Shape;98;gc6f75fceb_0_26:notes"/>
           <p:cNvSpPr/>
           <p:nvPr>
             <p:ph idx="2" type="sldImg"/>
@@ -1757,7 +1757,7 @@
       </p:sp>
       <p:sp>
         <p:nvSpPr>
-          <p:cNvPr id="95" name="Google Shape;95;gc6f75fceb_0_26:notes"/>
+          <p:cNvPr id="99" name="Google Shape;99;gc6f75fceb_0_26:notes"/>
           <p:cNvSpPr txBox="1"/>
           <p:nvPr>
             <p:ph idx="1" type="body"/>
@@ -1807,7 +1807,7 @@
   <p:cSld>
     <p:spTree>
       <p:nvGrpSpPr>
-        <p:cNvPr id="115" name="Shape 115"/>
+        <p:cNvPr id="119" name="Shape 119"/>
         <p:cNvGrpSpPr/>
         <p:nvPr/>
       </p:nvGrpSpPr>
@@ -1821,7 +1821,7 @@
       </p:grpSpPr>
       <p:sp>
         <p:nvSpPr>
-          <p:cNvPr id="116" name="Google Shape;116;gb2dc987236_0_368:notes"/>
+          <p:cNvPr id="120" name="Google Shape;120;gb2dc987236_0_368:notes"/>
           <p:cNvSpPr/>
           <p:nvPr>
             <p:ph idx="2" type="sldImg"/>
@@ -1856,7 +1856,7 @@
       </p:sp>
       <p:sp>
         <p:nvSpPr>
-          <p:cNvPr id="117" name="Google Shape;117;gb2dc987236_0_368:notes"/>
+          <p:cNvPr id="121" name="Google Shape;121;gb2dc987236_0_368:notes"/>
           <p:cNvSpPr txBox="1"/>
           <p:nvPr>
             <p:ph idx="1" type="body"/>
@@ -1906,7 +1906,7 @@
   <p:cSld>
     <p:spTree>
       <p:nvGrpSpPr>
-        <p:cNvPr id="121" name="Shape 121"/>
+        <p:cNvPr id="125" name="Shape 125"/>
         <p:cNvGrpSpPr/>
         <p:nvPr/>
       </p:nvGrpSpPr>
@@ -1920,7 +1920,7 @@
       </p:grpSpPr>
       <p:sp>
         <p:nvSpPr>
-          <p:cNvPr id="122" name="Google Shape;122;gb2dc987236_0_305:notes"/>
+          <p:cNvPr id="126" name="Google Shape;126;gb2dc987236_0_305:notes"/>
           <p:cNvSpPr/>
           <p:nvPr>
             <p:ph idx="2" type="sldImg"/>
@@ -1955,7 +1955,7 @@
       </p:sp>
       <p:sp>
         <p:nvSpPr>
-          <p:cNvPr id="123" name="Google Shape;123;gb2dc987236_0_305:notes"/>
+          <p:cNvPr id="127" name="Google Shape;127;gb2dc987236_0_305:notes"/>
           <p:cNvSpPr txBox="1"/>
           <p:nvPr>
             <p:ph idx="1" type="body"/>
@@ -7087,7 +7087,7 @@
             <a:tbl>
               <a:tblPr>
                 <a:noFill/>
-                <a:tableStyleId>{1A634EC8-4969-4378-A32D-DA169EEC15A9}</a:tableStyleId>
+                <a:tableStyleId>{7BF1D594-B17A-49D9-B815-81ECF3BB91A1}</a:tableStyleId>
               </a:tblPr>
               <a:tblGrid>
                 <a:gridCol w="3526600"/>
@@ -7759,7 +7759,7 @@
   <p:cSld>
     <p:spTree>
       <p:nvGrpSpPr>
-        <p:cNvPr id="132" name="Shape 132"/>
+        <p:cNvPr id="136" name="Shape 136"/>
         <p:cNvGrpSpPr/>
         <p:nvPr/>
       </p:nvGrpSpPr>
@@ -7773,7 +7773,7 @@
       </p:grpSpPr>
       <p:pic>
         <p:nvPicPr>
-          <p:cNvPr id="133" name="Google Shape;133;p22"/>
+          <p:cNvPr id="137" name="Google Shape;137;p22"/>
           <p:cNvPicPr preferRelativeResize="0"/>
           <p:nvPr/>
         </p:nvPicPr>
@@ -7801,7 +7801,7 @@
       </p:pic>
       <p:pic>
         <p:nvPicPr>
-          <p:cNvPr id="134" name="Google Shape;134;p22"/>
+          <p:cNvPr id="138" name="Google Shape;138;p22"/>
           <p:cNvPicPr preferRelativeResize="0"/>
           <p:nvPr/>
         </p:nvPicPr>
@@ -7829,7 +7829,7 @@
       </p:pic>
       <p:pic>
         <p:nvPicPr>
-          <p:cNvPr id="135" name="Google Shape;135;p22"/>
+          <p:cNvPr id="139" name="Google Shape;139;p22"/>
           <p:cNvPicPr preferRelativeResize="0"/>
           <p:nvPr/>
         </p:nvPicPr>
@@ -7857,7 +7857,7 @@
       </p:pic>
       <p:pic>
         <p:nvPicPr>
-          <p:cNvPr id="136" name="Google Shape;136;p22"/>
+          <p:cNvPr id="140" name="Google Shape;140;p22"/>
           <p:cNvPicPr preferRelativeResize="0"/>
           <p:nvPr/>
         </p:nvPicPr>
@@ -7896,7 +7896,7 @@
   <p:cSld>
     <p:spTree>
       <p:nvGrpSpPr>
-        <p:cNvPr id="140" name="Shape 140"/>
+        <p:cNvPr id="144" name="Shape 144"/>
         <p:cNvGrpSpPr/>
         <p:nvPr/>
       </p:nvGrpSpPr>
@@ -7910,7 +7910,7 @@
       </p:grpSpPr>
       <p:sp>
         <p:nvSpPr>
-          <p:cNvPr id="141" name="Google Shape;141;p23"/>
+          <p:cNvPr id="145" name="Google Shape;145;p23"/>
           <p:cNvSpPr txBox="1"/>
           <p:nvPr>
             <p:ph type="title"/>
@@ -7950,7 +7950,7 @@
       </p:sp>
       <p:sp>
         <p:nvSpPr>
-          <p:cNvPr id="142" name="Google Shape;142;p23"/>
+          <p:cNvPr id="146" name="Google Shape;146;p23"/>
           <p:cNvSpPr txBox="1"/>
           <p:nvPr/>
         </p:nvSpPr>
@@ -7996,7 +7996,7 @@
                 <a:sym typeface="Comic Sans MS"/>
                 <a:hlinkClick r:id="rId3"/>
               </a:rPr>
-              <a:t>Click me!</a:t>
+              <a:t>Click on me!</a:t>
             </a:r>
             <a:endParaRPr sz="3500">
               <a:latin typeface="Comic Sans MS"/>
@@ -8020,7 +8020,7 @@
   <p:cSld>
     <p:spTree>
       <p:nvGrpSpPr>
-        <p:cNvPr id="146" name="Shape 146"/>
+        <p:cNvPr id="150" name="Shape 150"/>
         <p:cNvGrpSpPr/>
         <p:nvPr/>
       </p:nvGrpSpPr>
@@ -8034,7 +8034,7 @@
       </p:grpSpPr>
       <p:sp>
         <p:nvSpPr>
-          <p:cNvPr id="147" name="Google Shape;147;p24"/>
+          <p:cNvPr id="151" name="Google Shape;151;p24"/>
           <p:cNvSpPr txBox="1"/>
           <p:nvPr>
             <p:ph type="title"/>
@@ -8079,7 +8079,7 @@
       </p:sp>
       <p:sp>
         <p:nvSpPr>
-          <p:cNvPr id="148" name="Google Shape;148;p24"/>
+          <p:cNvPr id="152" name="Google Shape;152;p24"/>
           <p:cNvSpPr txBox="1"/>
           <p:nvPr>
             <p:ph idx="1" type="body"/>
@@ -8173,7 +8173,7 @@
                 <a:cs typeface="Times New Roman"/>
                 <a:sym typeface="Times New Roman"/>
               </a:rPr>
-              <a:t> It is capable to provide easy and effective storage of information related to</a:t>
+              <a:t>It is capable to provide easy and effective storage of information related to</a:t>
             </a:r>
             <a:r>
               <a:rPr lang="en" sz="2000">
@@ -8243,7 +8243,7 @@
   <p:cSld>
     <p:spTree>
       <p:nvGrpSpPr>
-        <p:cNvPr id="152" name="Shape 152"/>
+        <p:cNvPr id="156" name="Shape 156"/>
         <p:cNvGrpSpPr/>
         <p:nvPr/>
       </p:nvGrpSpPr>
@@ -8257,7 +8257,7 @@
       </p:grpSpPr>
       <p:sp>
         <p:nvSpPr>
-          <p:cNvPr id="153" name="Google Shape;153;p25"/>
+          <p:cNvPr id="157" name="Google Shape;157;p25"/>
           <p:cNvSpPr txBox="1"/>
           <p:nvPr>
             <p:ph type="title"/>
@@ -8340,8 +8340,8 @@
         </p:nvSpPr>
         <p:spPr>
           <a:xfrm>
-            <a:off x="5180600" y="270700"/>
-            <a:ext cx="2615100" cy="4501200"/>
+            <a:off x="5391300" y="316625"/>
+            <a:ext cx="2615100" cy="4102500"/>
           </a:xfrm>
           <a:prstGeom prst="rect">
             <a:avLst/>
@@ -8370,8 +8370,7 @@
               <a:buNone/>
             </a:pPr>
             <a:r>
-              <a:rPr b="1" lang="en"/>
-              <a:t>Title</a:t>
+              <a:t/>
             </a:r>
             <a:endParaRPr b="1"/>
           </a:p>
@@ -8501,7 +8500,26 @@
             </a:pPr>
             <a:r>
               <a:rPr b="1" lang="en"/>
-              <a:t>Screenshots</a:t>
+              <a:t>Screenshot</a:t>
+            </a:r>
+            <a:endParaRPr b="1"/>
+          </a:p>
+          <a:p>
+            <a:pPr indent="0" lvl="0" marL="0" rtl="0" algn="l">
+              <a:lnSpc>
+                <a:spcPct val="100000"/>
+              </a:lnSpc>
+              <a:spcBef>
+                <a:spcPts val="1600"/>
+              </a:spcBef>
+              <a:spcAft>
+                <a:spcPts val="0"/>
+              </a:spcAft>
+              <a:buNone/>
+            </a:pPr>
+            <a:r>
+              <a:rPr b="1" lang="en"/>
+              <a:t>Execution</a:t>
             </a:r>
             <a:endParaRPr b="1"/>
           </a:p>
@@ -8700,7 +8718,7 @@
                 <a:cs typeface="Times New Roman"/>
                 <a:sym typeface="Times New Roman"/>
               </a:rPr>
-              <a:t>A Voice Based Library Management System is a software that has been developed to handle basic housekeeping functions of library.</a:t>
+              <a:t>A Voice Based Library Management System is a software that has been developed to handle basic housekeeping functions of a library.</a:t>
             </a:r>
             <a:endParaRPr sz="2200">
               <a:latin typeface="Times New Roman"/>
@@ -8914,8 +8932,8 @@
         </p:blipFill>
         <p:spPr>
           <a:xfrm>
-            <a:off x="964400" y="767525"/>
-            <a:ext cx="7296856" cy="4258396"/>
+            <a:off x="554000" y="799000"/>
+            <a:ext cx="8035991" cy="4152501"/>
           </a:xfrm>
           <a:prstGeom prst="rect">
             <a:avLst/>
@@ -9007,8 +9025,8 @@
         </p:blipFill>
         <p:spPr>
           <a:xfrm>
-            <a:off x="1581101" y="740800"/>
-            <a:ext cx="5981799" cy="4275775"/>
+            <a:off x="1574075" y="664600"/>
+            <a:ext cx="6139477" cy="4388475"/>
           </a:xfrm>
           <a:prstGeom prst="rect">
             <a:avLst/>
@@ -9100,7 +9118,7 @@
         </p:blipFill>
         <p:spPr>
           <a:xfrm>
-            <a:off x="5672901" y="1353836"/>
+            <a:off x="5444301" y="1353836"/>
             <a:ext cx="697290" cy="697288"/>
           </a:xfrm>
           <a:prstGeom prst="rect">
@@ -9128,7 +9146,7 @@
         </p:blipFill>
         <p:spPr>
           <a:xfrm>
-            <a:off x="5672900" y="2722890"/>
+            <a:off x="5444300" y="2722890"/>
             <a:ext cx="1325475" cy="608511"/>
           </a:xfrm>
           <a:prstGeom prst="rect">
@@ -9156,7 +9174,7 @@
         </p:blipFill>
         <p:spPr>
           <a:xfrm>
-            <a:off x="5672901" y="3808537"/>
+            <a:off x="5444301" y="3808537"/>
             <a:ext cx="697289" cy="697288"/>
           </a:xfrm>
           <a:prstGeom prst="rect">
@@ -9184,8 +9202,120 @@
         </p:blipFill>
         <p:spPr>
           <a:xfrm>
-            <a:off x="5672900" y="381900"/>
+            <a:off x="5444300" y="381900"/>
             <a:ext cx="1544100" cy="537875"/>
+          </a:xfrm>
+          <a:prstGeom prst="rect">
+            <a:avLst/>
+          </a:prstGeom>
+          <a:noFill/>
+          <a:ln>
+            <a:noFill/>
+          </a:ln>
+        </p:spPr>
+      </p:pic>
+      <p:pic>
+        <p:nvPicPr>
+          <p:cNvPr id="93" name="Google Shape;93;p18"/>
+          <p:cNvPicPr preferRelativeResize="0"/>
+          <p:nvPr/>
+        </p:nvPicPr>
+        <p:blipFill>
+          <a:blip r:embed="rId7">
+            <a:alphaModFix/>
+          </a:blip>
+          <a:stretch>
+            <a:fillRect/>
+          </a:stretch>
+        </p:blipFill>
+        <p:spPr>
+          <a:xfrm>
+            <a:off x="7592237" y="208725"/>
+            <a:ext cx="884226" cy="884226"/>
+          </a:xfrm>
+          <a:prstGeom prst="rect">
+            <a:avLst/>
+          </a:prstGeom>
+          <a:noFill/>
+          <a:ln>
+            <a:noFill/>
+          </a:ln>
+        </p:spPr>
+      </p:pic>
+      <p:pic>
+        <p:nvPicPr>
+          <p:cNvPr id="94" name="Google Shape;94;p18"/>
+          <p:cNvPicPr preferRelativeResize="0"/>
+          <p:nvPr/>
+        </p:nvPicPr>
+        <p:blipFill>
+          <a:blip r:embed="rId8">
+            <a:alphaModFix/>
+          </a:blip>
+          <a:stretch>
+            <a:fillRect/>
+          </a:stretch>
+        </p:blipFill>
+        <p:spPr>
+          <a:xfrm>
+            <a:off x="7685700" y="1353820"/>
+            <a:ext cx="697300" cy="985068"/>
+          </a:xfrm>
+          <a:prstGeom prst="rect">
+            <a:avLst/>
+          </a:prstGeom>
+          <a:noFill/>
+          <a:ln>
+            <a:noFill/>
+          </a:ln>
+        </p:spPr>
+      </p:pic>
+      <p:pic>
+        <p:nvPicPr>
+          <p:cNvPr id="95" name="Google Shape;95;p18"/>
+          <p:cNvPicPr preferRelativeResize="0"/>
+          <p:nvPr/>
+        </p:nvPicPr>
+        <p:blipFill>
+          <a:blip r:embed="rId9">
+            <a:alphaModFix/>
+          </a:blip>
+          <a:stretch>
+            <a:fillRect/>
+          </a:stretch>
+        </p:blipFill>
+        <p:spPr>
+          <a:xfrm>
+            <a:off x="7685700" y="3808514"/>
+            <a:ext cx="802575" cy="802550"/>
+          </a:xfrm>
+          <a:prstGeom prst="rect">
+            <a:avLst/>
+          </a:prstGeom>
+          <a:noFill/>
+          <a:ln>
+            <a:noFill/>
+          </a:ln>
+        </p:spPr>
+      </p:pic>
+      <p:pic>
+        <p:nvPicPr>
+          <p:cNvPr id="96" name="Google Shape;96;p18"/>
+          <p:cNvPicPr preferRelativeResize="0"/>
+          <p:nvPr/>
+        </p:nvPicPr>
+        <p:blipFill>
+          <a:blip r:embed="rId10">
+            <a:alphaModFix/>
+          </a:blip>
+          <a:stretch>
+            <a:fillRect/>
+          </a:stretch>
+        </p:blipFill>
+        <p:spPr>
+          <a:xfrm>
+            <a:off x="7685700" y="2722900"/>
+            <a:ext cx="802575" cy="802575"/>
           </a:xfrm>
           <a:prstGeom prst="rect">
             <a:avLst/>
@@ -9209,7 +9339,7 @@
   <p:cSld>
     <p:spTree>
       <p:nvGrpSpPr>
-        <p:cNvPr id="96" name="Shape 96"/>
+        <p:cNvPr id="100" name="Shape 100"/>
         <p:cNvGrpSpPr/>
         <p:nvPr/>
       </p:nvGrpSpPr>
@@ -9223,7 +9353,7 @@
       </p:grpSpPr>
       <p:sp>
         <p:nvSpPr>
-          <p:cNvPr id="97" name="Google Shape;97;p19"/>
+          <p:cNvPr id="101" name="Google Shape;101;p19"/>
           <p:cNvSpPr/>
           <p:nvPr/>
         </p:nvSpPr>
@@ -9266,7 +9396,7 @@
       </p:sp>
       <p:sp>
         <p:nvSpPr>
-          <p:cNvPr id="98" name="Google Shape;98;p19"/>
+          <p:cNvPr id="102" name="Google Shape;102;p19"/>
           <p:cNvSpPr txBox="1"/>
           <p:nvPr>
             <p:ph idx="4294967295" type="title"/>
@@ -9314,7 +9444,7 @@
       </p:sp>
       <p:grpSp>
         <p:nvGrpSpPr>
-          <p:cNvPr id="99" name="Google Shape;99;p19"/>
+          <p:cNvPr id="103" name="Google Shape;103;p19"/>
           <p:cNvGrpSpPr/>
           <p:nvPr/>
         </p:nvGrpSpPr>
@@ -9328,7 +9458,7 @@
         </p:grpSpPr>
         <p:sp>
           <p:nvSpPr>
-            <p:cNvPr id="100" name="Google Shape;100;p19"/>
+            <p:cNvPr id="104" name="Google Shape;104;p19"/>
             <p:cNvSpPr/>
             <p:nvPr/>
           </p:nvSpPr>
@@ -9371,7 +9501,7 @@
         </p:sp>
         <p:pic>
           <p:nvPicPr>
-            <p:cNvPr descr="Cartoonish illustration of a boy in a yellow shirt" id="101" name="Google Shape;101;p19"/>
+            <p:cNvPr descr="Cartoonish illustration of a boy in a yellow shirt" id="105" name="Google Shape;105;p19"/>
             <p:cNvPicPr preferRelativeResize="0"/>
             <p:nvPr/>
           </p:nvPicPr>
@@ -9399,7 +9529,7 @@
       </p:grpSp>
       <p:sp>
         <p:nvSpPr>
-          <p:cNvPr id="102" name="Google Shape;102;p19"/>
+          <p:cNvPr id="106" name="Google Shape;106;p19"/>
           <p:cNvSpPr txBox="1"/>
           <p:nvPr>
             <p:ph idx="4294967295" type="body"/>
@@ -9447,7 +9577,7 @@
       </p:sp>
       <p:sp>
         <p:nvSpPr>
-          <p:cNvPr id="103" name="Google Shape;103;p19"/>
+          <p:cNvPr id="107" name="Google Shape;107;p19"/>
           <p:cNvSpPr txBox="1"/>
           <p:nvPr>
             <p:ph idx="4294967295" type="body"/>
@@ -9487,7 +9617,7 @@
       </p:sp>
       <p:grpSp>
         <p:nvGrpSpPr>
-          <p:cNvPr id="104" name="Google Shape;104;p19"/>
+          <p:cNvPr id="108" name="Google Shape;108;p19"/>
           <p:cNvGrpSpPr/>
           <p:nvPr/>
         </p:nvGrpSpPr>
@@ -9501,7 +9631,7 @@
         </p:grpSpPr>
         <p:sp>
           <p:nvSpPr>
-            <p:cNvPr id="105" name="Google Shape;105;p19"/>
+            <p:cNvPr id="109" name="Google Shape;109;p19"/>
             <p:cNvSpPr/>
             <p:nvPr/>
           </p:nvSpPr>
@@ -9544,7 +9674,7 @@
         </p:sp>
         <p:pic>
           <p:nvPicPr>
-            <p:cNvPr descr="Cartoonish illustration of a woman with orange hair" id="106" name="Google Shape;106;p19"/>
+            <p:cNvPr descr="Cartoonish illustration of a woman with orange hair" id="110" name="Google Shape;110;p19"/>
             <p:cNvPicPr preferRelativeResize="0"/>
             <p:nvPr/>
           </p:nvPicPr>
@@ -9572,7 +9702,7 @@
       </p:grpSp>
       <p:sp>
         <p:nvSpPr>
-          <p:cNvPr id="107" name="Google Shape;107;p19"/>
+          <p:cNvPr id="111" name="Google Shape;111;p19"/>
           <p:cNvSpPr txBox="1"/>
           <p:nvPr>
             <p:ph idx="4294967295" type="body"/>
@@ -9620,7 +9750,7 @@
       </p:sp>
       <p:sp>
         <p:nvSpPr>
-          <p:cNvPr id="108" name="Google Shape;108;p19"/>
+          <p:cNvPr id="112" name="Google Shape;112;p19"/>
           <p:cNvSpPr txBox="1"/>
           <p:nvPr>
             <p:ph idx="4294967295" type="body"/>
@@ -9660,7 +9790,7 @@
       </p:sp>
       <p:grpSp>
         <p:nvGrpSpPr>
-          <p:cNvPr id="109" name="Google Shape;109;p19"/>
+          <p:cNvPr id="113" name="Google Shape;113;p19"/>
           <p:cNvGrpSpPr/>
           <p:nvPr/>
         </p:nvGrpSpPr>
@@ -9674,7 +9804,7 @@
         </p:grpSpPr>
         <p:sp>
           <p:nvSpPr>
-            <p:cNvPr id="110" name="Google Shape;110;p19"/>
+            <p:cNvPr id="114" name="Google Shape;114;p19"/>
             <p:cNvSpPr/>
             <p:nvPr/>
           </p:nvSpPr>
@@ -9717,7 +9847,7 @@
         </p:sp>
         <p:pic>
           <p:nvPicPr>
-            <p:cNvPr descr="Cartoonish illustration of a man in a blue shirt" id="111" name="Google Shape;111;p19"/>
+            <p:cNvPr descr="Cartoonish illustration of a man in a blue shirt" id="115" name="Google Shape;115;p19"/>
             <p:cNvPicPr preferRelativeResize="0"/>
             <p:nvPr/>
           </p:nvPicPr>
@@ -9746,7 +9876,7 @@
       </p:grpSp>
       <p:sp>
         <p:nvSpPr>
-          <p:cNvPr id="112" name="Google Shape;112;p19"/>
+          <p:cNvPr id="116" name="Google Shape;116;p19"/>
           <p:cNvSpPr txBox="1"/>
           <p:nvPr>
             <p:ph idx="4294967295" type="body"/>
@@ -9794,7 +9924,7 @@
       </p:sp>
       <p:sp>
         <p:nvSpPr>
-          <p:cNvPr id="113" name="Google Shape;113;p19"/>
+          <p:cNvPr id="117" name="Google Shape;117;p19"/>
           <p:cNvSpPr txBox="1"/>
           <p:nvPr>
             <p:ph idx="4294967295" type="body"/>
@@ -9834,7 +9964,7 @@
       </p:sp>
       <p:pic>
         <p:nvPicPr>
-          <p:cNvPr id="114" name="Google Shape;114;p19"/>
+          <p:cNvPr id="118" name="Google Shape;118;p19"/>
           <p:cNvPicPr preferRelativeResize="0"/>
           <p:nvPr/>
         </p:nvPicPr>
@@ -9873,7 +10003,7 @@
   <p:cSld>
     <p:spTree>
       <p:nvGrpSpPr>
-        <p:cNvPr id="118" name="Shape 118"/>
+        <p:cNvPr id="122" name="Shape 122"/>
         <p:cNvGrpSpPr/>
         <p:nvPr/>
       </p:nvGrpSpPr>
@@ -9887,7 +10017,7 @@
       </p:grpSpPr>
       <p:sp>
         <p:nvSpPr>
-          <p:cNvPr id="119" name="Google Shape;119;p20"/>
+          <p:cNvPr id="123" name="Google Shape;123;p20"/>
           <p:cNvSpPr txBox="1"/>
           <p:nvPr>
             <p:ph type="title"/>
@@ -9927,7 +10057,7 @@
       </p:sp>
       <p:sp>
         <p:nvSpPr>
-          <p:cNvPr id="120" name="Google Shape;120;p20"/>
+          <p:cNvPr id="124" name="Google Shape;124;p20"/>
           <p:cNvSpPr txBox="1"/>
           <p:nvPr>
             <p:ph idx="1" type="body"/>
@@ -10003,7 +10133,7 @@
             </a:pPr>
             <a:r>
               <a:rPr lang="en" sz="1600"/>
-              <a:t>A voice-based search system which can help students as well as faculty in searching of the books. </a:t>
+              <a:t>A voice-based search system which can help students as well as faculty in searching books. </a:t>
             </a:r>
             <a:endParaRPr sz="1600"/>
           </a:p>
@@ -10044,6 +10174,26 @@
             <a:r>
               <a:rPr lang="en" sz="1600"/>
               <a:t>Staff can insert, update, delete records from Authors, Publishers and Books</a:t>
+            </a:r>
+            <a:endParaRPr sz="1600"/>
+          </a:p>
+          <a:p>
+            <a:pPr indent="-330200" lvl="0" marL="457200" rtl="0" algn="l">
+              <a:lnSpc>
+                <a:spcPct val="150000"/>
+              </a:lnSpc>
+              <a:spcBef>
+                <a:spcPts val="0"/>
+              </a:spcBef>
+              <a:spcAft>
+                <a:spcPts val="0"/>
+              </a:spcAft>
+              <a:buSzPts val="1600"/>
+              <a:buChar char="●"/>
+            </a:pPr>
+            <a:r>
+              <a:rPr lang="en" sz="1600"/>
+              <a:t>Staff can view the no. of books borrowed and returned.</a:t>
             </a:r>
             <a:endParaRPr sz="1600"/>
           </a:p>
@@ -10110,7 +10260,7 @@
   <p:cSld>
     <p:spTree>
       <p:nvGrpSpPr>
-        <p:cNvPr id="124" name="Shape 124"/>
+        <p:cNvPr id="128" name="Shape 128"/>
         <p:cNvGrpSpPr/>
         <p:nvPr/>
       </p:nvGrpSpPr>
@@ -10124,7 +10274,7 @@
       </p:grpSpPr>
       <p:pic>
         <p:nvPicPr>
-          <p:cNvPr id="125" name="Google Shape;125;p21"/>
+          <p:cNvPr id="129" name="Google Shape;129;p21"/>
           <p:cNvPicPr preferRelativeResize="0"/>
           <p:nvPr/>
         </p:nvPicPr>
@@ -10152,7 +10302,7 @@
       </p:pic>
       <p:pic>
         <p:nvPicPr>
-          <p:cNvPr id="126" name="Google Shape;126;p21"/>
+          <p:cNvPr id="130" name="Google Shape;130;p21"/>
           <p:cNvPicPr preferRelativeResize="0"/>
           <p:nvPr/>
         </p:nvPicPr>
@@ -10180,7 +10330,7 @@
       </p:pic>
       <p:pic>
         <p:nvPicPr>
-          <p:cNvPr id="127" name="Google Shape;127;p21"/>
+          <p:cNvPr id="131" name="Google Shape;131;p21"/>
           <p:cNvPicPr preferRelativeResize="0"/>
           <p:nvPr/>
         </p:nvPicPr>
@@ -10208,7 +10358,7 @@
       </p:pic>
       <p:pic>
         <p:nvPicPr>
-          <p:cNvPr id="128" name="Google Shape;128;p21"/>
+          <p:cNvPr id="132" name="Google Shape;132;p21"/>
           <p:cNvPicPr preferRelativeResize="0"/>
           <p:nvPr/>
         </p:nvPicPr>

</xml_diff>